<commit_message>
doc: updated overview of the project ppt
</commit_message>
<xml_diff>
--- a/resources/Scard.pptx
+++ b/resources/Scard.pptx
@@ -367,7 +367,7 @@
           <a:p>
             <a:fld id="{9184DA70-C731-4C70-880D-CCD4705E623C}" type="datetime1">
               <a:rPr lang="en-US" smtClean="0"/>
-              <a:t>9/22/2020</a:t>
+              <a:t>9/25/2020</a:t>
             </a:fld>
             <a:endParaRPr lang="en-US" dirty="0"/>
           </a:p>
@@ -555,7 +555,7 @@
           <a:p>
             <a:fld id="{B612A279-0833-481D-8C56-F67FD0AC6C50}" type="datetime1">
               <a:rPr lang="en-US" smtClean="0"/>
-              <a:t>9/22/2020</a:t>
+              <a:t>9/25/2020</a:t>
             </a:fld>
             <a:endParaRPr lang="en-US" dirty="0"/>
           </a:p>
@@ -797,7 +797,7 @@
           <a:p>
             <a:fld id="{6587DA83-5663-4C9C-B9AA-0B40A3DAFF81}" type="datetime1">
               <a:rPr lang="en-US" smtClean="0"/>
-              <a:t>9/22/2020</a:t>
+              <a:t>9/25/2020</a:t>
             </a:fld>
             <a:endParaRPr lang="en-US" dirty="0"/>
           </a:p>
@@ -985,7 +985,7 @@
           <a:p>
             <a:fld id="{4BE1D723-8F53-4F53-90B0-1982A396982E}" type="datetime1">
               <a:rPr lang="en-US" smtClean="0"/>
-              <a:t>9/22/2020</a:t>
+              <a:t>9/25/2020</a:t>
             </a:fld>
             <a:endParaRPr lang="en-US" dirty="0"/>
           </a:p>
@@ -1358,7 +1358,7 @@
           <a:p>
             <a:fld id="{97669AF7-7BEB-44E4-9852-375E34362B5B}" type="datetime1">
               <a:rPr lang="en-US" smtClean="0"/>
-              <a:t>9/22/2020</a:t>
+              <a:t>9/25/2020</a:t>
             </a:fld>
             <a:endParaRPr lang="en-US" dirty="0"/>
           </a:p>
@@ -1613,7 +1613,7 @@
           <a:p>
             <a:fld id="{BAAAC38D-0552-4C82-B593-E6124DFADBE2}" type="datetime1">
               <a:rPr lang="en-US" smtClean="0"/>
-              <a:t>9/22/2020</a:t>
+              <a:t>9/25/2020</a:t>
             </a:fld>
             <a:endParaRPr lang="en-US" dirty="0"/>
           </a:p>
@@ -2010,7 +2010,7 @@
           <a:p>
             <a:fld id="{D9DF0F1C-5577-4ACB-BB62-DF8F3C494C7E}" type="datetime1">
               <a:rPr lang="en-US" smtClean="0"/>
-              <a:t>9/22/2020</a:t>
+              <a:t>9/25/2020</a:t>
             </a:fld>
             <a:endParaRPr lang="en-US" dirty="0"/>
           </a:p>
@@ -2146,7 +2146,7 @@
           <a:p>
             <a:fld id="{1775B394-D9F9-4F0C-B15D-605F45CB9E9F}" type="datetime1">
               <a:rPr lang="en-US" smtClean="0"/>
-              <a:t>9/22/2020</a:t>
+              <a:t>9/25/2020</a:t>
             </a:fld>
             <a:endParaRPr lang="en-US" dirty="0"/>
           </a:p>
@@ -2303,7 +2303,7 @@
           <a:p>
             <a:fld id="{39667345-2558-425A-8533-9BFDBCE15005}" type="datetime1">
               <a:rPr lang="en-US" smtClean="0"/>
-              <a:t>9/22/2020</a:t>
+              <a:t>9/25/2020</a:t>
             </a:fld>
             <a:endParaRPr lang="en-US" dirty="0"/>
           </a:p>
@@ -2632,7 +2632,7 @@
           <a:p>
             <a:fld id="{92BEA474-078D-4E9B-9B14-09A87B19DC46}" type="datetime1">
               <a:rPr lang="en-US" smtClean="0"/>
-              <a:t>9/22/2020</a:t>
+              <a:t>9/25/2020</a:t>
             </a:fld>
             <a:endParaRPr lang="en-US" dirty="0"/>
           </a:p>
@@ -2982,7 +2982,7 @@
           <a:p>
             <a:fld id="{4907D986-8816-4272-A432-0437A28A9828}" type="datetime1">
               <a:rPr lang="en-US" smtClean="0"/>
-              <a:t>9/22/2020</a:t>
+              <a:t>9/25/2020</a:t>
             </a:fld>
             <a:endParaRPr lang="en-US" dirty="0"/>
           </a:p>
@@ -3243,7 +3243,7 @@
           <a:p>
             <a:fld id="{62D6E202-B606-4609-B914-27C9371A1F6D}" type="datetime1">
               <a:rPr lang="en-US" smtClean="0"/>
-              <a:t>9/22/2020</a:t>
+              <a:t>9/25/2020</a:t>
             </a:fld>
             <a:endParaRPr lang="en-US" dirty="0"/>
           </a:p>
@@ -4321,7 +4321,7 @@
         </p:spPr>
         <p:txBody>
           <a:bodyPr>
-            <a:normAutofit fontScale="32500" lnSpcReduction="20000"/>
+            <a:normAutofit fontScale="25000" lnSpcReduction="20000"/>
           </a:bodyPr>
           <a:lstStyle/>
           <a:p>
@@ -4330,24 +4330,36 @@
               <a:buChar char="Ø"/>
             </a:pPr>
             <a:r>
-              <a:rPr lang="en-IN" sz="5200" b="1" i="1" dirty="0"/>
-              <a:t>S.C.A.R.D</a:t>
-            </a:r>
-            <a:r>
-              <a:rPr lang="en-IN" sz="5200" dirty="0"/>
-              <a:t> is a skin cancer detector which predicts the probability of skin cancer and also provide additional requirements to the patients with ease. This </a:t>
-            </a:r>
-            <a:r>
-              <a:rPr lang="en-IN" sz="5200" u="sng" dirty="0"/>
-              <a:t>application is cost effective where it does not need to get connected with any cloud platforms such as [AWS, GCP, Azure] or any external </a:t>
-            </a:r>
-            <a:r>
-              <a:rPr lang="en-IN" sz="5200" u="sng" dirty="0" err="1"/>
-              <a:t>hardwares</a:t>
-            </a:r>
-            <a:r>
-              <a:rPr lang="en-IN" sz="5200" u="sng" dirty="0"/>
-              <a:t>  for cancer estimation. </a:t>
+              <a:rPr lang="en-US" sz="6400" b="1" i="1" dirty="0"/>
+              <a:t>S.C.A.R.D </a:t>
+            </a:r>
+            <a:r>
+              <a:rPr lang="en-US" sz="6400" i="1" dirty="0"/>
+              <a:t>is a skin cancer detector which uses the </a:t>
+            </a:r>
+            <a:r>
+              <a:rPr lang="en-US" sz="6400" i="1" u="sng" dirty="0"/>
+              <a:t>complete power of the latest and trending technologies</a:t>
+            </a:r>
+            <a:r>
+              <a:rPr lang="en-US" sz="6400" b="1" i="1" dirty="0"/>
+              <a:t>, "AI at edge". why Edge?, Edge computing </a:t>
+            </a:r>
+            <a:r>
+              <a:rPr lang="en-US" sz="6400" i="1" dirty="0"/>
+              <a:t>provides the </a:t>
+            </a:r>
+            <a:r>
+              <a:rPr lang="en-US" sz="6400" b="1" i="1" dirty="0"/>
+              <a:t>On-premise deployment </a:t>
+            </a:r>
+            <a:r>
+              <a:rPr lang="en-US" sz="6400" i="1" dirty="0"/>
+              <a:t>of the models instead of centralizing it in the cloud, It provides </a:t>
+            </a:r>
+            <a:r>
+              <a:rPr lang="en-US" sz="6400" b="1" i="1" dirty="0"/>
+              <a:t>Data security, cutting down the costs of investment on cloud technologies such as [AWS, Azure, GCP] .</a:t>
             </a:r>
           </a:p>
           <a:p>
@@ -4356,16 +4368,36 @@
               <a:buChar char="Ø"/>
             </a:pPr>
             <a:r>
-              <a:rPr lang="en-IN" sz="5200" dirty="0"/>
-              <a:t>This application can be deployed at the hospitals for emergency use cases like, whenever a doctor is late it can be used for early diagnostics. And </a:t>
-            </a:r>
-            <a:r>
-              <a:rPr lang="en-IN" sz="5200" b="1" i="1" dirty="0"/>
-              <a:t>it is also very helpful in cancer estimation within a fraction of seconds, with a very minimum hardware requirements, without sending data to cloud for processing</a:t>
-            </a:r>
-            <a:r>
-              <a:rPr lang="en-IN" sz="5200" dirty="0"/>
-              <a:t>.</a:t>
+              <a:rPr lang="en-US" sz="6400" b="1" i="1" u="sng" dirty="0"/>
+              <a:t>Healthcare data is one of the most sensitive data </a:t>
+            </a:r>
+            <a:r>
+              <a:rPr lang="en-US" sz="6400" i="1" u="sng" dirty="0"/>
+              <a:t>and sending such data across someone else's cloud servers for processing is a </a:t>
+            </a:r>
+            <a:r>
+              <a:rPr lang="en-US" sz="6400" i="1" u="sng" dirty="0" err="1"/>
+              <a:t>voilation</a:t>
+            </a:r>
+            <a:r>
+              <a:rPr lang="en-US" sz="6400" i="1" u="sng" dirty="0"/>
+              <a:t> of patient’s privacy even though </a:t>
+            </a:r>
+            <a:r>
+              <a:rPr lang="en-US" sz="6400" b="1" i="1" u="sng" dirty="0"/>
+              <a:t>the Cloud Service Providers </a:t>
+            </a:r>
+            <a:r>
+              <a:rPr lang="en-US" sz="6400" i="1" u="sng" dirty="0"/>
+              <a:t>doesn't use your data, and it is costly for its monthly subscriptions</a:t>
+            </a:r>
+            <a:r>
+              <a:rPr lang="en-US" sz="6400" dirty="0"/>
+              <a:t>. This application introduces </a:t>
+            </a:r>
+            <a:r>
+              <a:rPr lang="en-US" sz="6400" b="1" i="1" dirty="0"/>
+              <a:t>Edge deployment of models which is a one time investment with state of the art performance and promises accurate results with very less time and without any external hardware.</a:t>
             </a:r>
           </a:p>
           <a:p>
@@ -4374,15 +4406,15 @@
               <a:buChar char="Ø"/>
             </a:pPr>
             <a:r>
-              <a:rPr lang="en-IN" sz="5200" dirty="0"/>
+              <a:rPr lang="en-IN" sz="6400" dirty="0"/>
               <a:t> And this is just the tip of the iceberg, as we know that </a:t>
             </a:r>
             <a:r>
-              <a:rPr lang="en-IN" sz="5200" i="1" u="sng" dirty="0"/>
+              <a:rPr lang="en-IN" sz="6400" i="1" u="sng" dirty="0"/>
               <a:t>Stanford has created a deep learning model which is able to classify skin cancer better than dermatologists. Deploying such models at Edge will help doctors to get quick insights about the skin lesion of the patient’s</a:t>
             </a:r>
             <a:r>
-              <a:rPr lang="en-IN" sz="5200" dirty="0"/>
+              <a:rPr lang="en-IN" sz="6400" dirty="0"/>
               <a:t>. </a:t>
             </a:r>
           </a:p>
@@ -4392,23 +4424,23 @@
               <a:buChar char="Ø"/>
             </a:pPr>
             <a:r>
-              <a:rPr lang="en-IN" sz="5200" i="1" dirty="0"/>
+              <a:rPr lang="en-IN" sz="6400" i="1" dirty="0"/>
               <a:t>Running highly advanced deep learning models on Edge devices such as [PC’s or Laptop’s which has the ability to run complex </a:t>
             </a:r>
             <a:r>
-              <a:rPr lang="en-IN" sz="5200" i="1" dirty="0" err="1"/>
+              <a:rPr lang="en-IN" sz="6400" i="1" dirty="0" err="1"/>
               <a:t>softwares</a:t>
             </a:r>
             <a:r>
-              <a:rPr lang="en-IN" sz="5200" i="1" dirty="0"/>
+              <a:rPr lang="en-IN" sz="6400" i="1" dirty="0"/>
               <a:t>] is better than Mobile devices, And </a:t>
             </a:r>
             <a:r>
-              <a:rPr lang="en-IN" sz="5200" b="1" i="1" u="sng" dirty="0"/>
-              <a:t>Rural parts of India does not either have enough skin specialists or Smartphones to search for treatment of the skin lesions, In such places, these systems can help lots of people with ease, even without an internet connection with very less investments</a:t>
-            </a:r>
-            <a:r>
-              <a:rPr lang="en-IN" sz="5200" b="1" i="1" dirty="0"/>
+              <a:rPr lang="en-IN" sz="6400" b="1" i="1" u="sng" dirty="0"/>
+              <a:t>Rural parts of India does not either have enough skin specialists or Smartphones to search for treatment of the skin lesions, In such places, these systems can help lots of people with ease, even without any network connectivity with very less investments</a:t>
+            </a:r>
+            <a:r>
+              <a:rPr lang="en-IN" sz="6400" b="1" i="1" dirty="0"/>
               <a:t>.</a:t>
             </a:r>
           </a:p>
@@ -8310,6 +8342,24 @@
 </file>
 
 <file path=customXml/item1.xml><?xml version="1.0" encoding="utf-8"?>
+<p:properties xmlns:p="http://schemas.microsoft.com/office/2006/metadata/properties" xmlns:xsi="http://www.w3.org/2001/XMLSchema-instance" xmlns:pc="http://schemas.microsoft.com/office/infopath/2007/PartnerControls">
+  <documentManagement>
+    <Status xmlns="71af3243-3dd4-4a8d-8c0d-dd76da1f02a5">Not started</Status>
+    <MediaServiceKeyPoints xmlns="71af3243-3dd4-4a8d-8c0d-dd76da1f02a5" xsi:nil="true"/>
+  </documentManagement>
+</p:properties>
+</file>
+
+<file path=customXml/item2.xml><?xml version="1.0" encoding="utf-8"?>
+<?mso-contentType ?>
+<FormTemplates xmlns="http://schemas.microsoft.com/sharepoint/v3/contenttype/forms">
+  <Display>DocumentLibraryForm</Display>
+  <Edit>DocumentLibraryForm</Edit>
+  <New>DocumentLibraryForm</New>
+</FormTemplates>
+</file>
+
+<file path=customXml/item3.xml><?xml version="1.0" encoding="utf-8"?>
 <ct:contentTypeSchema xmlns:ct="http://schemas.microsoft.com/office/2006/metadata/contentType" xmlns:ma="http://schemas.microsoft.com/office/2006/metadata/properties/metaAttributes" ct:_="" ma:_="" ma:contentTypeName="Document" ma:contentTypeID="0x01010079F111ED35F8CC479449609E8A0923A6" ma:contentTypeVersion="12" ma:contentTypeDescription="Create a new document." ma:contentTypeScope="" ma:versionID="a410dd7f93c95333ffa1b60ed6adedd1">
   <xsd:schema xmlns:xsd="http://www.w3.org/2001/XMLSchema" xmlns:xs="http://www.w3.org/2001/XMLSchema" xmlns:p="http://schemas.microsoft.com/office/2006/metadata/properties" xmlns:ns2="71af3243-3dd4-4a8d-8c0d-dd76da1f02a5" xmlns:ns3="16c05727-aa75-4e4a-9b5f-8a80a1165891" targetNamespace="http://schemas.microsoft.com/office/2006/metadata/properties" ma:root="true" ma:fieldsID="a936d9baba76aa3866493feff160faab" ns2:_="" ns3:_="">
     <xsd:import namespace="71af3243-3dd4-4a8d-8c0d-dd76da1f02a5"/>
@@ -8530,25 +8580,25 @@
 </ct:contentTypeSchema>
 </file>
 
-<file path=customXml/item2.xml><?xml version="1.0" encoding="utf-8"?>
-<?mso-contentType ?>
-<FormTemplates xmlns="http://schemas.microsoft.com/sharepoint/v3/contenttype/forms">
-  <Display>DocumentLibraryForm</Display>
-  <Edit>DocumentLibraryForm</Edit>
-  <New>DocumentLibraryForm</New>
-</FormTemplates>
+<file path=customXml/itemProps1.xml><?xml version="1.0" encoding="utf-8"?>
+<ds:datastoreItem xmlns:ds="http://schemas.openxmlformats.org/officeDocument/2006/customXml" ds:itemID="{00646C36-D994-4DBD-9A53-9B2DFD8D7208}">
+  <ds:schemaRefs>
+    <ds:schemaRef ds:uri="http://schemas.microsoft.com/office/2006/metadata/properties"/>
+    <ds:schemaRef ds:uri="http://schemas.microsoft.com/office/infopath/2007/PartnerControls"/>
+    <ds:schemaRef ds:uri="71af3243-3dd4-4a8d-8c0d-dd76da1f02a5"/>
+  </ds:schemaRefs>
+</ds:datastoreItem>
 </file>
 
-<file path=customXml/item3.xml><?xml version="1.0" encoding="utf-8"?>
-<p:properties xmlns:p="http://schemas.microsoft.com/office/2006/metadata/properties" xmlns:xsi="http://www.w3.org/2001/XMLSchema-instance" xmlns:pc="http://schemas.microsoft.com/office/infopath/2007/PartnerControls">
-  <documentManagement>
-    <Status xmlns="71af3243-3dd4-4a8d-8c0d-dd76da1f02a5">Not started</Status>
-    <MediaServiceKeyPoints xmlns="71af3243-3dd4-4a8d-8c0d-dd76da1f02a5" xsi:nil="true"/>
-  </documentManagement>
-</p:properties>
+<file path=customXml/itemProps2.xml><?xml version="1.0" encoding="utf-8"?>
+<ds:datastoreItem xmlns:ds="http://schemas.openxmlformats.org/officeDocument/2006/customXml" ds:itemID="{147854D2-C2B1-4273-BEE8-C059778BC500}">
+  <ds:schemaRefs>
+    <ds:schemaRef ds:uri="http://schemas.microsoft.com/sharepoint/v3/contenttype/forms"/>
+  </ds:schemaRefs>
+</ds:datastoreItem>
 </file>
 
-<file path=customXml/itemProps1.xml><?xml version="1.0" encoding="utf-8"?>
+<file path=customXml/itemProps3.xml><?xml version="1.0" encoding="utf-8"?>
 <ds:datastoreItem xmlns:ds="http://schemas.openxmlformats.org/officeDocument/2006/customXml" ds:itemID="{A2A4E875-040F-4F4E-A5A7-1188084B7F3F}">
   <ds:schemaRefs>
     <ds:schemaRef ds:uri="http://schemas.microsoft.com/office/2006/metadata/contentType"/>
@@ -8565,22 +8615,4 @@
     <ds:schemaRef ds:uri="http://schemas.microsoft.com/internal/obd"/>
   </ds:schemaRefs>
 </ds:datastoreItem>
-</file>
-
-<file path=customXml/itemProps2.xml><?xml version="1.0" encoding="utf-8"?>
-<ds:datastoreItem xmlns:ds="http://schemas.openxmlformats.org/officeDocument/2006/customXml" ds:itemID="{147854D2-C2B1-4273-BEE8-C059778BC500}">
-  <ds:schemaRefs>
-    <ds:schemaRef ds:uri="http://schemas.microsoft.com/sharepoint/v3/contenttype/forms"/>
-  </ds:schemaRefs>
-</ds:datastoreItem>
-</file>
-
-<file path=customXml/itemProps3.xml><?xml version="1.0" encoding="utf-8"?>
-<ds:datastoreItem xmlns:ds="http://schemas.openxmlformats.org/officeDocument/2006/customXml" ds:itemID="{00646C36-D994-4DBD-9A53-9B2DFD8D7208}">
-  <ds:schemaRefs>
-    <ds:schemaRef ds:uri="http://schemas.microsoft.com/office/2006/metadata/properties"/>
-    <ds:schemaRef ds:uri="http://schemas.microsoft.com/office/infopath/2007/PartnerControls"/>
-    <ds:schemaRef ds:uri="71af3243-3dd4-4a8d-8c0d-dd76da1f02a5"/>
-  </ds:schemaRefs>
-</ds:datastoreItem>
 </file>
</xml_diff>